<commit_message>
updated material CSCI 111
</commit_message>
<xml_diff>
--- a/CSCI-111/week-4/week-4-lecture.pptx
+++ b/CSCI-111/week-4/week-4-lecture.pptx
@@ -11790,10 +11790,20 @@
               <a:buNone/>
             </a:pPr>
             <a:r>
-              <a:rPr lang="en" sz="3000"/>
+              <a:rPr lang="en" sz="3600">
+                <a:latin typeface="Times New Roman"/>
+                <a:ea typeface="Times New Roman"/>
+                <a:cs typeface="Times New Roman"/>
+                <a:sym typeface="Times New Roman"/>
+              </a:rPr>
               <a:t>Float</a:t>
             </a:r>
-            <a:endParaRPr sz="3000"/>
+            <a:endParaRPr sz="3600">
+              <a:latin typeface="Times New Roman"/>
+              <a:ea typeface="Times New Roman"/>
+              <a:cs typeface="Times New Roman"/>
+              <a:sym typeface="Times New Roman"/>
+            </a:endParaRPr>
           </a:p>
         </p:txBody>
       </p:sp>
@@ -11921,37 +11931,37 @@
               <a:buNone/>
             </a:pPr>
             <a:r>
-              <a:rPr b="0" i="0" lang="en" sz="2400" u="none" cap="none" strike="noStrike">
+              <a:rPr i="0" lang="en" sz="2400" u="none" cap="none" strike="noStrike">
                 <a:solidFill>
                   <a:srgbClr val="000000"/>
                 </a:solidFill>
-                <a:latin typeface="Calibri"/>
-                <a:ea typeface="Calibri"/>
-                <a:cs typeface="Calibri"/>
-                <a:sym typeface="Calibri"/>
+                <a:latin typeface="Times New Roman"/>
+                <a:ea typeface="Times New Roman"/>
+                <a:cs typeface="Times New Roman"/>
+                <a:sym typeface="Times New Roman"/>
               </a:rPr>
               <a:t>Elements in Normal flow,  </a:t>
             </a:r>
             <a:r>
-              <a:rPr b="0" i="0" lang="en" sz="2400" u="none" cap="none" strike="noStrike">
+              <a:rPr i="0" lang="en" sz="2400" u="none" cap="none" strike="noStrike">
                 <a:solidFill>
                   <a:srgbClr val="FF0000"/>
                 </a:solidFill>
-                <a:latin typeface="Calibri"/>
-                <a:ea typeface="Calibri"/>
-                <a:cs typeface="Calibri"/>
-                <a:sym typeface="Calibri"/>
+                <a:latin typeface="Times New Roman"/>
+                <a:ea typeface="Times New Roman"/>
+                <a:cs typeface="Times New Roman"/>
+                <a:sym typeface="Times New Roman"/>
               </a:rPr>
               <a:t>not floated</a:t>
             </a:r>
-            <a:endParaRPr b="0" i="0" sz="2400" u="none" cap="none" strike="noStrike">
+            <a:endParaRPr i="0" sz="2400" u="none" cap="none" strike="noStrike">
               <a:solidFill>
                 <a:srgbClr val="000000"/>
               </a:solidFill>
-              <a:latin typeface="Calibri"/>
-              <a:ea typeface="Calibri"/>
-              <a:cs typeface="Calibri"/>
-              <a:sym typeface="Calibri"/>
+              <a:latin typeface="Times New Roman"/>
+              <a:ea typeface="Times New Roman"/>
+              <a:cs typeface="Times New Roman"/>
+              <a:sym typeface="Times New Roman"/>
             </a:endParaRPr>
           </a:p>
         </p:txBody>
@@ -11999,61 +12009,61 @@
               <a:buNone/>
             </a:pPr>
             <a:r>
-              <a:rPr b="0" i="0" lang="en" sz="2400" u="sng" cap="none" strike="noStrike">
+              <a:rPr i="0" lang="en" sz="2400" u="sng" cap="none" strike="noStrike">
                 <a:solidFill>
                   <a:srgbClr val="000000"/>
                 </a:solidFill>
-                <a:latin typeface="Calibri"/>
-                <a:ea typeface="Calibri"/>
-                <a:cs typeface="Calibri"/>
-                <a:sym typeface="Calibri"/>
+                <a:latin typeface="Times New Roman"/>
+                <a:ea typeface="Times New Roman"/>
+                <a:cs typeface="Times New Roman"/>
+                <a:sym typeface="Times New Roman"/>
               </a:rPr>
               <a:t>Paragraph 1</a:t>
             </a:r>
             <a:r>
-              <a:rPr b="0" i="0" lang="en" sz="2400" u="none" cap="none" strike="noStrike">
+              <a:rPr i="0" lang="en" sz="2400" u="none" cap="none" strike="noStrike">
                 <a:solidFill>
                   <a:srgbClr val="000000"/>
                 </a:solidFill>
-                <a:latin typeface="Calibri"/>
-                <a:ea typeface="Calibri"/>
-                <a:cs typeface="Calibri"/>
-                <a:sym typeface="Calibri"/>
+                <a:latin typeface="Times New Roman"/>
+                <a:ea typeface="Times New Roman"/>
+                <a:cs typeface="Times New Roman"/>
+                <a:sym typeface="Times New Roman"/>
               </a:rPr>
               <a:t> is </a:t>
             </a:r>
             <a:r>
-              <a:rPr b="0" i="0" lang="en" sz="2400" u="none" cap="none" strike="noStrike">
+              <a:rPr i="0" lang="en" sz="2400" u="none" cap="none" strike="noStrike">
                 <a:solidFill>
                   <a:srgbClr val="FF0000"/>
                 </a:solidFill>
-                <a:latin typeface="Calibri"/>
-                <a:ea typeface="Calibri"/>
-                <a:cs typeface="Calibri"/>
-                <a:sym typeface="Calibri"/>
+                <a:latin typeface="Times New Roman"/>
+                <a:ea typeface="Times New Roman"/>
+                <a:cs typeface="Times New Roman"/>
+                <a:sym typeface="Times New Roman"/>
               </a:rPr>
               <a:t>floated </a:t>
             </a:r>
             <a:r>
-              <a:rPr b="0" i="0" lang="en" sz="2400" u="none" cap="none" strike="noStrike">
+              <a:rPr i="0" lang="en" sz="2400" u="none" cap="none" strike="noStrike">
                 <a:solidFill>
                   <a:srgbClr val="000000"/>
                 </a:solidFill>
-                <a:latin typeface="Calibri"/>
-                <a:ea typeface="Calibri"/>
-                <a:cs typeface="Calibri"/>
-                <a:sym typeface="Calibri"/>
+                <a:latin typeface="Times New Roman"/>
+                <a:ea typeface="Times New Roman"/>
+                <a:cs typeface="Times New Roman"/>
+                <a:sym typeface="Times New Roman"/>
               </a:rPr>
               <a:t>to the right</a:t>
             </a:r>
-            <a:endParaRPr b="0" i="0" sz="2400" u="none" cap="none" strike="noStrike">
+            <a:endParaRPr i="0" sz="2400" u="none" cap="none" strike="noStrike">
               <a:solidFill>
                 <a:srgbClr val="000000"/>
               </a:solidFill>
-              <a:latin typeface="Calibri"/>
-              <a:ea typeface="Calibri"/>
-              <a:cs typeface="Calibri"/>
-              <a:sym typeface="Calibri"/>
+              <a:latin typeface="Times New Roman"/>
+              <a:ea typeface="Times New Roman"/>
+              <a:cs typeface="Times New Roman"/>
+              <a:sym typeface="Times New Roman"/>
             </a:endParaRPr>
           </a:p>
         </p:txBody>
@@ -12101,74 +12111,74 @@
               <a:buNone/>
             </a:pPr>
             <a:r>
-              <a:rPr b="0" i="0" lang="en" sz="2400" u="sng" cap="none" strike="noStrike">
+              <a:rPr i="0" lang="en" sz="2400" u="sng" cap="none" strike="noStrike">
                 <a:solidFill>
                   <a:srgbClr val="000000"/>
                 </a:solidFill>
-                <a:latin typeface="Calibri"/>
-                <a:ea typeface="Calibri"/>
-                <a:cs typeface="Calibri"/>
-                <a:sym typeface="Calibri"/>
+                <a:latin typeface="Times New Roman"/>
+                <a:ea typeface="Times New Roman"/>
+                <a:cs typeface="Times New Roman"/>
+                <a:sym typeface="Times New Roman"/>
               </a:rPr>
               <a:t>Paragraph 1</a:t>
             </a:r>
             <a:r>
-              <a:rPr b="0" i="0" lang="en" sz="2400" u="none" cap="none" strike="noStrike">
+              <a:rPr i="0" lang="en" sz="2400" u="none" cap="none" strike="noStrike">
                 <a:solidFill>
                   <a:srgbClr val="000000"/>
                 </a:solidFill>
-                <a:latin typeface="Calibri"/>
-                <a:ea typeface="Calibri"/>
-                <a:cs typeface="Calibri"/>
-                <a:sym typeface="Calibri"/>
+                <a:latin typeface="Times New Roman"/>
+                <a:ea typeface="Times New Roman"/>
+                <a:cs typeface="Times New Roman"/>
+                <a:sym typeface="Times New Roman"/>
               </a:rPr>
               <a:t> is </a:t>
             </a:r>
             <a:r>
-              <a:rPr b="0" i="0" lang="en" sz="2400" u="none" cap="none" strike="noStrike">
+              <a:rPr i="0" lang="en" sz="2400" u="none" cap="none" strike="noStrike">
                 <a:solidFill>
                   <a:srgbClr val="FF0000"/>
                 </a:solidFill>
-                <a:latin typeface="Calibri"/>
-                <a:ea typeface="Calibri"/>
-                <a:cs typeface="Calibri"/>
-                <a:sym typeface="Calibri"/>
+                <a:latin typeface="Times New Roman"/>
+                <a:ea typeface="Times New Roman"/>
+                <a:cs typeface="Times New Roman"/>
+                <a:sym typeface="Times New Roman"/>
               </a:rPr>
               <a:t>floated </a:t>
             </a:r>
             <a:r>
-              <a:rPr b="0" i="0" lang="en" sz="2400" u="none" cap="none" strike="noStrike">
+              <a:rPr i="0" lang="en" sz="2400" u="none" cap="none" strike="noStrike">
                 <a:solidFill>
                   <a:srgbClr val="000000"/>
                 </a:solidFill>
-                <a:latin typeface="Calibri"/>
-                <a:ea typeface="Calibri"/>
-                <a:cs typeface="Calibri"/>
-                <a:sym typeface="Calibri"/>
+                <a:latin typeface="Times New Roman"/>
+                <a:ea typeface="Times New Roman"/>
+                <a:cs typeface="Times New Roman"/>
+                <a:sym typeface="Times New Roman"/>
               </a:rPr>
               <a:t>to the right,  </a:t>
             </a:r>
             <a:r>
-              <a:rPr b="0" i="0" lang="en" sz="2400" u="sng" cap="none" strike="noStrike">
+              <a:rPr i="0" lang="en" sz="2400" u="sng" cap="none" strike="noStrike">
                 <a:solidFill>
                   <a:srgbClr val="000000"/>
                 </a:solidFill>
-                <a:latin typeface="Calibri"/>
-                <a:ea typeface="Calibri"/>
-                <a:cs typeface="Calibri"/>
-                <a:sym typeface="Calibri"/>
+                <a:latin typeface="Times New Roman"/>
+                <a:ea typeface="Times New Roman"/>
+                <a:cs typeface="Times New Roman"/>
+                <a:sym typeface="Times New Roman"/>
               </a:rPr>
               <a:t>Paragraph 2</a:t>
             </a:r>
             <a:r>
-              <a:rPr b="0" i="0" lang="en" sz="2400" u="none" cap="none" strike="noStrike">
+              <a:rPr i="0" lang="en" sz="2400" u="none" cap="none" strike="noStrike">
                 <a:solidFill>
                   <a:srgbClr val="000000"/>
                 </a:solidFill>
-                <a:latin typeface="Calibri"/>
-                <a:ea typeface="Calibri"/>
-                <a:cs typeface="Calibri"/>
-                <a:sym typeface="Calibri"/>
+                <a:latin typeface="Times New Roman"/>
+                <a:ea typeface="Times New Roman"/>
+                <a:cs typeface="Times New Roman"/>
+                <a:sym typeface="Times New Roman"/>
               </a:rPr>
               <a:t> is </a:t>
             </a:r>
@@ -12177,21 +12187,21 @@
                 <a:solidFill>
                   <a:srgbClr val="4472C4"/>
                 </a:solidFill>
-                <a:latin typeface="Calibri"/>
-                <a:ea typeface="Calibri"/>
-                <a:cs typeface="Calibri"/>
-                <a:sym typeface="Calibri"/>
+                <a:latin typeface="Times New Roman"/>
+                <a:ea typeface="Times New Roman"/>
+                <a:cs typeface="Times New Roman"/>
+                <a:sym typeface="Times New Roman"/>
               </a:rPr>
               <a:t>cleared</a:t>
             </a:r>
-            <a:endParaRPr b="0" i="0" sz="2400" u="none" cap="none" strike="noStrike">
+            <a:endParaRPr i="0" sz="2400" u="none" cap="none" strike="noStrike">
               <a:solidFill>
                 <a:srgbClr val="000000"/>
               </a:solidFill>
-              <a:latin typeface="Calibri"/>
-              <a:ea typeface="Calibri"/>
-              <a:cs typeface="Calibri"/>
-              <a:sym typeface="Calibri"/>
+              <a:latin typeface="Times New Roman"/>
+              <a:ea typeface="Times New Roman"/>
+              <a:cs typeface="Times New Roman"/>
+              <a:sym typeface="Times New Roman"/>
             </a:endParaRPr>
           </a:p>
         </p:txBody>
@@ -12262,10 +12272,20 @@
               <a:buNone/>
             </a:pPr>
             <a:r>
-              <a:rPr lang="en" sz="3000"/>
+              <a:rPr lang="en" sz="3000">
+                <a:latin typeface="Times New Roman"/>
+                <a:ea typeface="Times New Roman"/>
+                <a:cs typeface="Times New Roman"/>
+                <a:sym typeface="Times New Roman"/>
+              </a:rPr>
               <a:t>Position</a:t>
             </a:r>
-            <a:endParaRPr sz="3000"/>
+            <a:endParaRPr sz="3000">
+              <a:latin typeface="Times New Roman"/>
+              <a:ea typeface="Times New Roman"/>
+              <a:cs typeface="Times New Roman"/>
+              <a:sym typeface="Times New Roman"/>
+            </a:endParaRPr>
           </a:p>
         </p:txBody>
       </p:sp>
@@ -12318,10 +12338,10 @@
                 <a:solidFill>
                   <a:srgbClr val="FF0000"/>
                 </a:solidFill>
-                <a:latin typeface="Calibri"/>
-                <a:ea typeface="Calibri"/>
-                <a:cs typeface="Calibri"/>
-                <a:sym typeface="Calibri"/>
+                <a:latin typeface="Times New Roman"/>
+                <a:ea typeface="Times New Roman"/>
+                <a:cs typeface="Times New Roman"/>
+                <a:sym typeface="Times New Roman"/>
               </a:rPr>
               <a:t>Position </a:t>
             </a:r>
@@ -12330,10 +12350,10 @@
                 <a:solidFill>
                   <a:schemeClr val="dk1"/>
                 </a:solidFill>
-                <a:latin typeface="Calibri"/>
-                <a:ea typeface="Calibri"/>
-                <a:cs typeface="Calibri"/>
-                <a:sym typeface="Calibri"/>
+                <a:latin typeface="Times New Roman"/>
+                <a:ea typeface="Times New Roman"/>
+                <a:cs typeface="Times New Roman"/>
+                <a:sym typeface="Times New Roman"/>
               </a:rPr>
               <a:t>property specifies the type of positioning method used for an  element:</a:t>
             </a:r>
@@ -12341,10 +12361,10 @@
               <a:solidFill>
                 <a:schemeClr val="dk1"/>
               </a:solidFill>
-              <a:latin typeface="Calibri"/>
-              <a:ea typeface="Calibri"/>
-              <a:cs typeface="Calibri"/>
-              <a:sym typeface="Calibri"/>
+              <a:latin typeface="Times New Roman"/>
+              <a:ea typeface="Times New Roman"/>
+              <a:cs typeface="Times New Roman"/>
+              <a:sym typeface="Times New Roman"/>
             </a:endParaRPr>
           </a:p>
           <a:p>
@@ -12369,10 +12389,10 @@
                 <a:solidFill>
                   <a:srgbClr val="FF0000"/>
                 </a:solidFill>
-                <a:latin typeface="Calibri"/>
-                <a:ea typeface="Calibri"/>
-                <a:cs typeface="Calibri"/>
-                <a:sym typeface="Calibri"/>
+                <a:latin typeface="Times New Roman"/>
+                <a:ea typeface="Times New Roman"/>
+                <a:cs typeface="Times New Roman"/>
+                <a:sym typeface="Times New Roman"/>
               </a:rPr>
               <a:t>static </a:t>
             </a:r>
@@ -12381,10 +12401,10 @@
                 <a:solidFill>
                   <a:schemeClr val="dk1"/>
                 </a:solidFill>
-                <a:latin typeface="Calibri"/>
-                <a:ea typeface="Calibri"/>
-                <a:cs typeface="Calibri"/>
-                <a:sym typeface="Calibri"/>
+                <a:latin typeface="Times New Roman"/>
+                <a:ea typeface="Times New Roman"/>
+                <a:cs typeface="Times New Roman"/>
+                <a:sym typeface="Times New Roman"/>
               </a:rPr>
               <a:t>- positioned according to the </a:t>
             </a:r>
@@ -12393,10 +12413,10 @@
                 <a:solidFill>
                   <a:schemeClr val="dk1"/>
                 </a:solidFill>
-                <a:latin typeface="Calibri"/>
-                <a:ea typeface="Calibri"/>
-                <a:cs typeface="Calibri"/>
-                <a:sym typeface="Calibri"/>
+                <a:latin typeface="Times New Roman"/>
+                <a:ea typeface="Times New Roman"/>
+                <a:cs typeface="Times New Roman"/>
+                <a:sym typeface="Times New Roman"/>
               </a:rPr>
               <a:t>normal flow</a:t>
             </a:r>
@@ -12405,10 +12425,10 @@
                 <a:solidFill>
                   <a:schemeClr val="dk1"/>
                 </a:solidFill>
-                <a:latin typeface="Calibri"/>
-                <a:ea typeface="Calibri"/>
-                <a:cs typeface="Calibri"/>
-                <a:sym typeface="Calibri"/>
+                <a:latin typeface="Times New Roman"/>
+                <a:ea typeface="Times New Roman"/>
+                <a:cs typeface="Times New Roman"/>
+                <a:sym typeface="Times New Roman"/>
               </a:rPr>
               <a:t> (default)</a:t>
             </a:r>
@@ -12416,10 +12436,10 @@
               <a:solidFill>
                 <a:schemeClr val="dk1"/>
               </a:solidFill>
-              <a:latin typeface="Calibri"/>
-              <a:ea typeface="Calibri"/>
-              <a:cs typeface="Calibri"/>
-              <a:sym typeface="Calibri"/>
+              <a:latin typeface="Times New Roman"/>
+              <a:ea typeface="Times New Roman"/>
+              <a:cs typeface="Times New Roman"/>
+              <a:sym typeface="Times New Roman"/>
             </a:endParaRPr>
           </a:p>
           <a:p>
@@ -12444,10 +12464,10 @@
                 <a:solidFill>
                   <a:srgbClr val="548235"/>
                 </a:solidFill>
-                <a:latin typeface="Calibri"/>
-                <a:ea typeface="Calibri"/>
-                <a:cs typeface="Calibri"/>
-                <a:sym typeface="Calibri"/>
+                <a:latin typeface="Times New Roman"/>
+                <a:ea typeface="Times New Roman"/>
+                <a:cs typeface="Times New Roman"/>
+                <a:sym typeface="Times New Roman"/>
               </a:rPr>
               <a:t>relative </a:t>
             </a:r>
@@ -12456,10 +12476,10 @@
                 <a:solidFill>
                   <a:schemeClr val="dk1"/>
                 </a:solidFill>
-                <a:latin typeface="Calibri"/>
-                <a:ea typeface="Calibri"/>
-                <a:cs typeface="Calibri"/>
-                <a:sym typeface="Calibri"/>
+                <a:latin typeface="Times New Roman"/>
+                <a:ea typeface="Times New Roman"/>
+                <a:cs typeface="Times New Roman"/>
+                <a:sym typeface="Times New Roman"/>
               </a:rPr>
               <a:t>- positioned relative to its </a:t>
             </a:r>
@@ -12468,10 +12488,10 @@
                 <a:solidFill>
                   <a:schemeClr val="dk1"/>
                 </a:solidFill>
-                <a:latin typeface="Calibri"/>
-                <a:ea typeface="Calibri"/>
-                <a:cs typeface="Calibri"/>
-                <a:sym typeface="Calibri"/>
+                <a:latin typeface="Times New Roman"/>
+                <a:ea typeface="Times New Roman"/>
+                <a:cs typeface="Times New Roman"/>
+                <a:sym typeface="Times New Roman"/>
               </a:rPr>
               <a:t>normal position</a:t>
             </a:r>
@@ -12480,10 +12500,10 @@
                 <a:solidFill>
                   <a:schemeClr val="dk1"/>
                 </a:solidFill>
-                <a:latin typeface="Calibri"/>
-                <a:ea typeface="Calibri"/>
-                <a:cs typeface="Calibri"/>
-                <a:sym typeface="Calibri"/>
+                <a:latin typeface="Times New Roman"/>
+                <a:ea typeface="Times New Roman"/>
+                <a:cs typeface="Times New Roman"/>
+                <a:sym typeface="Times New Roman"/>
               </a:rPr>
               <a:t> (</a:t>
             </a:r>
@@ -12492,10 +12512,10 @@
                 <a:solidFill>
                   <a:srgbClr val="C00000"/>
                 </a:solidFill>
-                <a:latin typeface="Calibri"/>
-                <a:ea typeface="Calibri"/>
-                <a:cs typeface="Calibri"/>
-                <a:sym typeface="Calibri"/>
+                <a:latin typeface="Times New Roman"/>
+                <a:ea typeface="Times New Roman"/>
+                <a:cs typeface="Times New Roman"/>
+                <a:sym typeface="Times New Roman"/>
               </a:rPr>
               <a:t>preserves </a:t>
             </a:r>
@@ -12504,10 +12524,10 @@
                 <a:solidFill>
                   <a:schemeClr val="dk1"/>
                 </a:solidFill>
-                <a:latin typeface="Calibri"/>
-                <a:ea typeface="Calibri"/>
-                <a:cs typeface="Calibri"/>
-                <a:sym typeface="Calibri"/>
+                <a:latin typeface="Times New Roman"/>
+                <a:ea typeface="Times New Roman"/>
+                <a:cs typeface="Times New Roman"/>
+                <a:sym typeface="Times New Roman"/>
               </a:rPr>
               <a:t>space)</a:t>
             </a:r>
@@ -12515,10 +12535,10 @@
               <a:solidFill>
                 <a:schemeClr val="dk1"/>
               </a:solidFill>
-              <a:latin typeface="Calibri"/>
-              <a:ea typeface="Calibri"/>
-              <a:cs typeface="Calibri"/>
-              <a:sym typeface="Calibri"/>
+              <a:latin typeface="Times New Roman"/>
+              <a:ea typeface="Times New Roman"/>
+              <a:cs typeface="Times New Roman"/>
+              <a:sym typeface="Times New Roman"/>
             </a:endParaRPr>
           </a:p>
           <a:p>
@@ -12543,10 +12563,10 @@
                 <a:solidFill>
                   <a:srgbClr val="4472C4"/>
                 </a:solidFill>
-                <a:latin typeface="Calibri"/>
-                <a:ea typeface="Calibri"/>
-                <a:cs typeface="Calibri"/>
-                <a:sym typeface="Calibri"/>
+                <a:latin typeface="Times New Roman"/>
+                <a:ea typeface="Times New Roman"/>
+                <a:cs typeface="Times New Roman"/>
+                <a:sym typeface="Times New Roman"/>
               </a:rPr>
               <a:t>absolute </a:t>
             </a:r>
@@ -12555,10 +12575,10 @@
                 <a:solidFill>
                   <a:schemeClr val="dk1"/>
                 </a:solidFill>
-                <a:latin typeface="Calibri"/>
-                <a:ea typeface="Calibri"/>
-                <a:cs typeface="Calibri"/>
-                <a:sym typeface="Calibri"/>
+                <a:latin typeface="Times New Roman"/>
+                <a:ea typeface="Times New Roman"/>
+                <a:cs typeface="Times New Roman"/>
+                <a:sym typeface="Times New Roman"/>
               </a:rPr>
               <a:t>- positioned relative to the </a:t>
             </a:r>
@@ -12567,10 +12587,10 @@
                 <a:solidFill>
                   <a:schemeClr val="dk1"/>
                 </a:solidFill>
-                <a:latin typeface="Calibri"/>
-                <a:ea typeface="Calibri"/>
-                <a:cs typeface="Calibri"/>
-                <a:sym typeface="Calibri"/>
+                <a:latin typeface="Times New Roman"/>
+                <a:ea typeface="Times New Roman"/>
+                <a:cs typeface="Times New Roman"/>
+                <a:sym typeface="Times New Roman"/>
               </a:rPr>
               <a:t>nearest positioned ancestor</a:t>
             </a:r>
@@ -12579,10 +12599,10 @@
                 <a:solidFill>
                   <a:schemeClr val="dk1"/>
                 </a:solidFill>
-                <a:latin typeface="Calibri"/>
-                <a:ea typeface="Calibri"/>
-                <a:cs typeface="Calibri"/>
-                <a:sym typeface="Calibri"/>
+                <a:latin typeface="Times New Roman"/>
+                <a:ea typeface="Times New Roman"/>
+                <a:cs typeface="Times New Roman"/>
+                <a:sym typeface="Times New Roman"/>
               </a:rPr>
               <a:t> (</a:t>
             </a:r>
@@ -12591,10 +12611,10 @@
                 <a:solidFill>
                   <a:srgbClr val="C00000"/>
                 </a:solidFill>
-                <a:latin typeface="Calibri"/>
-                <a:ea typeface="Calibri"/>
-                <a:cs typeface="Calibri"/>
-                <a:sym typeface="Calibri"/>
+                <a:latin typeface="Times New Roman"/>
+                <a:ea typeface="Times New Roman"/>
+                <a:cs typeface="Times New Roman"/>
+                <a:sym typeface="Times New Roman"/>
               </a:rPr>
               <a:t>removes </a:t>
             </a:r>
@@ -12603,10 +12623,10 @@
                 <a:solidFill>
                   <a:schemeClr val="dk1"/>
                 </a:solidFill>
-                <a:latin typeface="Calibri"/>
-                <a:ea typeface="Calibri"/>
-                <a:cs typeface="Calibri"/>
-                <a:sym typeface="Calibri"/>
+                <a:latin typeface="Times New Roman"/>
+                <a:ea typeface="Times New Roman"/>
+                <a:cs typeface="Times New Roman"/>
+                <a:sym typeface="Times New Roman"/>
               </a:rPr>
               <a:t>space)</a:t>
             </a:r>
@@ -12614,10 +12634,10 @@
               <a:solidFill>
                 <a:schemeClr val="dk1"/>
               </a:solidFill>
-              <a:latin typeface="Calibri"/>
-              <a:ea typeface="Calibri"/>
-              <a:cs typeface="Calibri"/>
-              <a:sym typeface="Calibri"/>
+              <a:latin typeface="Times New Roman"/>
+              <a:ea typeface="Times New Roman"/>
+              <a:cs typeface="Times New Roman"/>
+              <a:sym typeface="Times New Roman"/>
             </a:endParaRPr>
           </a:p>
           <a:p>
@@ -12642,10 +12662,10 @@
                 <a:solidFill>
                   <a:srgbClr val="843C0C"/>
                 </a:solidFill>
-                <a:latin typeface="Calibri"/>
-                <a:ea typeface="Calibri"/>
-                <a:cs typeface="Calibri"/>
-                <a:sym typeface="Calibri"/>
+                <a:latin typeface="Times New Roman"/>
+                <a:ea typeface="Times New Roman"/>
+                <a:cs typeface="Times New Roman"/>
+                <a:sym typeface="Times New Roman"/>
               </a:rPr>
               <a:t>fixed </a:t>
             </a:r>
@@ -12654,10 +12674,10 @@
                 <a:solidFill>
                   <a:schemeClr val="dk1"/>
                 </a:solidFill>
-                <a:latin typeface="Calibri"/>
-                <a:ea typeface="Calibri"/>
-                <a:cs typeface="Calibri"/>
-                <a:sym typeface="Calibri"/>
+                <a:latin typeface="Times New Roman"/>
+                <a:ea typeface="Times New Roman"/>
+                <a:cs typeface="Times New Roman"/>
+                <a:sym typeface="Times New Roman"/>
               </a:rPr>
               <a:t>- positioned relative to the </a:t>
             </a:r>
@@ -12666,10 +12686,10 @@
                 <a:solidFill>
                   <a:schemeClr val="dk1"/>
                 </a:solidFill>
-                <a:latin typeface="Calibri"/>
-                <a:ea typeface="Calibri"/>
-                <a:cs typeface="Calibri"/>
-                <a:sym typeface="Calibri"/>
+                <a:latin typeface="Times New Roman"/>
+                <a:ea typeface="Times New Roman"/>
+                <a:cs typeface="Times New Roman"/>
+                <a:sym typeface="Times New Roman"/>
               </a:rPr>
               <a:t>viewport</a:t>
             </a:r>
@@ -12678,10 +12698,10 @@
                 <a:solidFill>
                   <a:schemeClr val="dk1"/>
                 </a:solidFill>
-                <a:latin typeface="Calibri"/>
-                <a:ea typeface="Calibri"/>
-                <a:cs typeface="Calibri"/>
-                <a:sym typeface="Calibri"/>
+                <a:latin typeface="Times New Roman"/>
+                <a:ea typeface="Times New Roman"/>
+                <a:cs typeface="Times New Roman"/>
+                <a:sym typeface="Times New Roman"/>
               </a:rPr>
               <a:t> (</a:t>
             </a:r>
@@ -12690,10 +12710,10 @@
                 <a:solidFill>
                   <a:srgbClr val="C00000"/>
                 </a:solidFill>
-                <a:latin typeface="Calibri"/>
-                <a:ea typeface="Calibri"/>
-                <a:cs typeface="Calibri"/>
-                <a:sym typeface="Calibri"/>
+                <a:latin typeface="Times New Roman"/>
+                <a:ea typeface="Times New Roman"/>
+                <a:cs typeface="Times New Roman"/>
+                <a:sym typeface="Times New Roman"/>
               </a:rPr>
               <a:t>removes </a:t>
             </a:r>
@@ -12702,10 +12722,10 @@
                 <a:solidFill>
                   <a:schemeClr val="dk1"/>
                 </a:solidFill>
-                <a:latin typeface="Calibri"/>
-                <a:ea typeface="Calibri"/>
-                <a:cs typeface="Calibri"/>
-                <a:sym typeface="Calibri"/>
+                <a:latin typeface="Times New Roman"/>
+                <a:ea typeface="Times New Roman"/>
+                <a:cs typeface="Times New Roman"/>
+                <a:sym typeface="Times New Roman"/>
               </a:rPr>
               <a:t>space)</a:t>
             </a:r>
@@ -12713,10 +12733,10 @@
               <a:solidFill>
                 <a:schemeClr val="dk1"/>
               </a:solidFill>
-              <a:latin typeface="Calibri"/>
-              <a:ea typeface="Calibri"/>
-              <a:cs typeface="Calibri"/>
-              <a:sym typeface="Calibri"/>
+              <a:latin typeface="Times New Roman"/>
+              <a:ea typeface="Times New Roman"/>
+              <a:cs typeface="Times New Roman"/>
+              <a:sym typeface="Times New Roman"/>
             </a:endParaRPr>
           </a:p>
           <a:p>
@@ -12741,10 +12761,10 @@
                 <a:solidFill>
                   <a:srgbClr val="7030A0"/>
                 </a:solidFill>
-                <a:latin typeface="Calibri"/>
-                <a:ea typeface="Calibri"/>
-                <a:cs typeface="Calibri"/>
-                <a:sym typeface="Calibri"/>
+                <a:latin typeface="Times New Roman"/>
+                <a:ea typeface="Times New Roman"/>
+                <a:cs typeface="Times New Roman"/>
+                <a:sym typeface="Times New Roman"/>
               </a:rPr>
               <a:t>sticky </a:t>
             </a:r>
@@ -12753,10 +12773,10 @@
                 <a:solidFill>
                   <a:schemeClr val="dk1"/>
                 </a:solidFill>
-                <a:latin typeface="Calibri"/>
-                <a:ea typeface="Calibri"/>
-                <a:cs typeface="Calibri"/>
-                <a:sym typeface="Calibri"/>
+                <a:latin typeface="Times New Roman"/>
+                <a:ea typeface="Times New Roman"/>
+                <a:cs typeface="Times New Roman"/>
+                <a:sym typeface="Times New Roman"/>
               </a:rPr>
               <a:t>- positioned based on the user's </a:t>
             </a:r>
@@ -12765,10 +12785,10 @@
                 <a:solidFill>
                   <a:schemeClr val="dk1"/>
                 </a:solidFill>
-                <a:latin typeface="Calibri"/>
-                <a:ea typeface="Calibri"/>
-                <a:cs typeface="Calibri"/>
-                <a:sym typeface="Calibri"/>
+                <a:latin typeface="Times New Roman"/>
+                <a:ea typeface="Times New Roman"/>
+                <a:cs typeface="Times New Roman"/>
+                <a:sym typeface="Times New Roman"/>
               </a:rPr>
               <a:t>scroll position</a:t>
             </a:r>
@@ -12777,10 +12797,10 @@
                 <a:solidFill>
                   <a:schemeClr val="dk1"/>
                 </a:solidFill>
-                <a:latin typeface="Calibri"/>
-                <a:ea typeface="Calibri"/>
-                <a:cs typeface="Calibri"/>
-                <a:sym typeface="Calibri"/>
+                <a:latin typeface="Times New Roman"/>
+                <a:ea typeface="Times New Roman"/>
+                <a:cs typeface="Times New Roman"/>
+                <a:sym typeface="Times New Roman"/>
               </a:rPr>
               <a:t> (as relative or fixed)</a:t>
             </a:r>
@@ -12788,10 +12808,10 @@
               <a:solidFill>
                 <a:schemeClr val="dk1"/>
               </a:solidFill>
-              <a:latin typeface="Calibri"/>
-              <a:ea typeface="Calibri"/>
-              <a:cs typeface="Calibri"/>
-              <a:sym typeface="Calibri"/>
+              <a:latin typeface="Times New Roman"/>
+              <a:ea typeface="Times New Roman"/>
+              <a:cs typeface="Times New Roman"/>
+              <a:sym typeface="Times New Roman"/>
             </a:endParaRPr>
           </a:p>
           <a:p>
@@ -12816,10 +12836,10 @@
                 <a:solidFill>
                   <a:schemeClr val="dk1"/>
                 </a:solidFill>
-                <a:latin typeface="Calibri"/>
-                <a:ea typeface="Calibri"/>
-                <a:cs typeface="Calibri"/>
-                <a:sym typeface="Calibri"/>
+                <a:latin typeface="Times New Roman"/>
+                <a:ea typeface="Times New Roman"/>
+                <a:cs typeface="Times New Roman"/>
+                <a:sym typeface="Times New Roman"/>
               </a:rPr>
               <a:t>Elements are positioned using the </a:t>
             </a:r>
@@ -12828,10 +12848,10 @@
                 <a:solidFill>
                   <a:srgbClr val="FF0000"/>
                 </a:solidFill>
-                <a:latin typeface="Calibri"/>
-                <a:ea typeface="Calibri"/>
-                <a:cs typeface="Calibri"/>
-                <a:sym typeface="Calibri"/>
+                <a:latin typeface="Times New Roman"/>
+                <a:ea typeface="Times New Roman"/>
+                <a:cs typeface="Times New Roman"/>
+                <a:sym typeface="Times New Roman"/>
               </a:rPr>
               <a:t>top, bottom, left, </a:t>
             </a:r>
@@ -12840,10 +12860,10 @@
                 <a:solidFill>
                   <a:schemeClr val="dk1"/>
                 </a:solidFill>
-                <a:latin typeface="Calibri"/>
-                <a:ea typeface="Calibri"/>
-                <a:cs typeface="Calibri"/>
-                <a:sym typeface="Calibri"/>
+                <a:latin typeface="Times New Roman"/>
+                <a:ea typeface="Times New Roman"/>
+                <a:cs typeface="Times New Roman"/>
+                <a:sym typeface="Times New Roman"/>
               </a:rPr>
               <a:t>and </a:t>
             </a:r>
@@ -12852,10 +12872,10 @@
                 <a:solidFill>
                   <a:srgbClr val="FF0000"/>
                 </a:solidFill>
-                <a:latin typeface="Calibri"/>
-                <a:ea typeface="Calibri"/>
-                <a:cs typeface="Calibri"/>
-                <a:sym typeface="Calibri"/>
+                <a:latin typeface="Times New Roman"/>
+                <a:ea typeface="Times New Roman"/>
+                <a:cs typeface="Times New Roman"/>
+                <a:sym typeface="Times New Roman"/>
               </a:rPr>
               <a:t>right </a:t>
             </a:r>
@@ -12864,10 +12884,10 @@
                 <a:solidFill>
                   <a:schemeClr val="dk1"/>
                 </a:solidFill>
-                <a:latin typeface="Calibri"/>
-                <a:ea typeface="Calibri"/>
-                <a:cs typeface="Calibri"/>
-                <a:sym typeface="Calibri"/>
+                <a:latin typeface="Times New Roman"/>
+                <a:ea typeface="Times New Roman"/>
+                <a:cs typeface="Times New Roman"/>
+                <a:sym typeface="Times New Roman"/>
               </a:rPr>
               <a:t>properties.</a:t>
             </a:r>
@@ -14181,6 +14201,45 @@
               <a:buNone/>
             </a:pPr>
             <a:r>
+              <a:rPr lang="en" sz="2800">
+                <a:solidFill>
+                  <a:schemeClr val="dk1"/>
+                </a:solidFill>
+                <a:latin typeface="Times New Roman"/>
+                <a:ea typeface="Times New Roman"/>
+                <a:cs typeface="Times New Roman"/>
+                <a:sym typeface="Times New Roman"/>
+              </a:rPr>
+              <a:t>Several ideas to mention:</a:t>
+            </a:r>
+            <a:endParaRPr sz="2800">
+              <a:solidFill>
+                <a:schemeClr val="dk1"/>
+              </a:solidFill>
+              <a:latin typeface="Times New Roman"/>
+              <a:ea typeface="Times New Roman"/>
+              <a:cs typeface="Times New Roman"/>
+              <a:sym typeface="Times New Roman"/>
+            </a:endParaRPr>
+          </a:p>
+          <a:p>
+            <a:pPr indent="-203200" lvl="0" marL="698500" rtl="0" algn="l">
+              <a:lnSpc>
+                <a:spcPct val="100000"/>
+              </a:lnSpc>
+              <a:spcBef>
+                <a:spcPts val="540"/>
+              </a:spcBef>
+              <a:spcAft>
+                <a:spcPts val="0"/>
+              </a:spcAft>
+              <a:buClr>
+                <a:schemeClr val="dk1"/>
+              </a:buClr>
+              <a:buSzPts val="2600"/>
+              <a:buChar char="•"/>
+            </a:pPr>
+            <a:r>
               <a:rPr lang="en" sz="2600">
                 <a:solidFill>
                   <a:schemeClr val="dk1"/>
@@ -14190,7 +14249,31 @@
                 <a:cs typeface="Times New Roman"/>
                 <a:sym typeface="Times New Roman"/>
               </a:rPr>
-              <a:t>Several ideas to mention:</a:t>
+              <a:t>Use </a:t>
+            </a:r>
+            <a:r>
+              <a:rPr b="1" lang="en" sz="2600">
+                <a:solidFill>
+                  <a:srgbClr val="FF0000"/>
+                </a:solidFill>
+                <a:latin typeface="Times New Roman"/>
+                <a:ea typeface="Times New Roman"/>
+                <a:cs typeface="Times New Roman"/>
+                <a:sym typeface="Times New Roman"/>
+              </a:rPr>
+              <a:t>semantic </a:t>
+            </a:r>
+            <a:r>
+              <a:rPr lang="en" sz="2600">
+                <a:solidFill>
+                  <a:schemeClr val="dk1"/>
+                </a:solidFill>
+                <a:latin typeface="Times New Roman"/>
+                <a:ea typeface="Times New Roman"/>
+                <a:cs typeface="Times New Roman"/>
+                <a:sym typeface="Times New Roman"/>
+              </a:rPr>
+              <a:t>elements (header, nav, footer, section)</a:t>
             </a:r>
             <a:endParaRPr sz="2600">
               <a:solidFill>
@@ -14208,7 +14291,7 @@
                 <a:spcPct val="100000"/>
               </a:lnSpc>
               <a:spcBef>
-                <a:spcPts val="540"/>
+                <a:spcPts val="505"/>
               </a:spcBef>
               <a:spcAft>
                 <a:spcPts val="0"/>
@@ -14229,19 +14312,19 @@
                 <a:cs typeface="Times New Roman"/>
                 <a:sym typeface="Times New Roman"/>
               </a:rPr>
-              <a:t>Use </a:t>
+              <a:t>Header, nav and footer are </a:t>
             </a:r>
             <a:r>
               <a:rPr b="1" lang="en" sz="2600">
                 <a:solidFill>
-                  <a:srgbClr val="FF0000"/>
-                </a:solidFill>
-                <a:latin typeface="Times New Roman"/>
-                <a:ea typeface="Times New Roman"/>
-                <a:cs typeface="Times New Roman"/>
-                <a:sym typeface="Times New Roman"/>
-              </a:rPr>
-              <a:t>semantic </a:t>
+                  <a:srgbClr val="548235"/>
+                </a:solidFill>
+                <a:latin typeface="Times New Roman"/>
+                <a:ea typeface="Times New Roman"/>
+                <a:cs typeface="Times New Roman"/>
+                <a:sym typeface="Times New Roman"/>
+              </a:rPr>
+              <a:t>block </a:t>
             </a:r>
             <a:r>
               <a:rPr lang="en" sz="2600">
@@ -14253,7 +14336,7 @@
                 <a:cs typeface="Times New Roman"/>
                 <a:sym typeface="Times New Roman"/>
               </a:rPr>
-              <a:t>elements (header, nav, footer, section)</a:t>
+              <a:t>elements, i.e. take all line</a:t>
             </a:r>
             <a:endParaRPr sz="2600">
               <a:solidFill>
@@ -14292,69 +14375,6 @@
                 <a:cs typeface="Times New Roman"/>
                 <a:sym typeface="Times New Roman"/>
               </a:rPr>
-              <a:t>Header,, nav and footer are </a:t>
-            </a:r>
-            <a:r>
-              <a:rPr b="1" lang="en" sz="2600">
-                <a:solidFill>
-                  <a:srgbClr val="548235"/>
-                </a:solidFill>
-                <a:latin typeface="Times New Roman"/>
-                <a:ea typeface="Times New Roman"/>
-                <a:cs typeface="Times New Roman"/>
-                <a:sym typeface="Times New Roman"/>
-              </a:rPr>
-              <a:t>block </a:t>
-            </a:r>
-            <a:r>
-              <a:rPr lang="en" sz="2600">
-                <a:solidFill>
-                  <a:schemeClr val="dk1"/>
-                </a:solidFill>
-                <a:latin typeface="Times New Roman"/>
-                <a:ea typeface="Times New Roman"/>
-                <a:cs typeface="Times New Roman"/>
-                <a:sym typeface="Times New Roman"/>
-              </a:rPr>
-              <a:t>elements, i.e. take all line</a:t>
-            </a:r>
-            <a:endParaRPr sz="2600">
-              <a:solidFill>
-                <a:schemeClr val="dk1"/>
-              </a:solidFill>
-              <a:latin typeface="Times New Roman"/>
-              <a:ea typeface="Times New Roman"/>
-              <a:cs typeface="Times New Roman"/>
-              <a:sym typeface="Times New Roman"/>
-            </a:endParaRPr>
-          </a:p>
-          <a:p>
-            <a:pPr indent="-203200" lvl="0" marL="698500" rtl="0" algn="l">
-              <a:lnSpc>
-                <a:spcPct val="100000"/>
-              </a:lnSpc>
-              <a:spcBef>
-                <a:spcPts val="505"/>
-              </a:spcBef>
-              <a:spcAft>
-                <a:spcPts val="0"/>
-              </a:spcAft>
-              <a:buClr>
-                <a:schemeClr val="dk1"/>
-              </a:buClr>
-              <a:buSzPts val="2600"/>
-              <a:buChar char="•"/>
-            </a:pPr>
-            <a:r>
-              <a:rPr lang="en" sz="2600">
-                <a:solidFill>
-                  <a:schemeClr val="dk1"/>
-                </a:solidFill>
-                <a:latin typeface="Times New Roman"/>
-                <a:ea typeface="Times New Roman"/>
-                <a:cs typeface="Times New Roman"/>
-                <a:sym typeface="Times New Roman"/>
-              </a:rPr>
               <a:t>To make </a:t>
             </a:r>
             <a:r>
@@ -14483,46 +14503,6 @@
                 <a:sym typeface="Times New Roman"/>
               </a:rPr>
               <a:t>define column width in percentage (e.g.: 25%-50%-25%)</a:t>
-            </a:r>
-            <a:endParaRPr sz="2600">
-              <a:solidFill>
-                <a:schemeClr val="dk1"/>
-              </a:solidFill>
-              <a:latin typeface="Times New Roman"/>
-              <a:ea typeface="Times New Roman"/>
-              <a:cs typeface="Times New Roman"/>
-              <a:sym typeface="Times New Roman"/>
-            </a:endParaRPr>
-          </a:p>
-          <a:p>
-            <a:pPr indent="-203200" lvl="0" marL="698500" rtl="0" algn="l">
-              <a:lnSpc>
-                <a:spcPct val="100000"/>
-              </a:lnSpc>
-              <a:spcBef>
-                <a:spcPts val="490"/>
-              </a:spcBef>
-              <a:spcAft>
-                <a:spcPts val="0"/>
-              </a:spcAft>
-              <a:buClr>
-                <a:schemeClr val="dk1"/>
-              </a:buClr>
-              <a:buSzPts val="2600"/>
-              <a:buFont typeface="Times New Roman"/>
-              <a:buChar char="•"/>
-            </a:pPr>
-            <a:r>
-              <a:rPr lang="en" sz="2600">
-                <a:solidFill>
-                  <a:schemeClr val="dk1"/>
-                </a:solidFill>
-                <a:latin typeface="Times New Roman"/>
-                <a:ea typeface="Times New Roman"/>
-                <a:cs typeface="Times New Roman"/>
-                <a:sym typeface="Times New Roman"/>
-              </a:rPr>
-              <a:t>See the code (index_layout.html, style3.css)</a:t>
             </a:r>
             <a:endParaRPr sz="2600">
               <a:solidFill>
@@ -19657,37 +19637,37 @@
               <a:buNone/>
             </a:pPr>
             <a:r>
-              <a:rPr b="0" i="0" lang="en" sz="2400" u="none" cap="none" strike="noStrike">
+              <a:rPr i="0" lang="en" sz="2400" u="none" cap="none" strike="noStrike">
                 <a:solidFill>
                   <a:srgbClr val="FF0000"/>
                 </a:solidFill>
-                <a:latin typeface="Calibri"/>
-                <a:ea typeface="Calibri"/>
-                <a:cs typeface="Calibri"/>
-                <a:sym typeface="Calibri"/>
+                <a:latin typeface="Times New Roman"/>
+                <a:ea typeface="Times New Roman"/>
+                <a:cs typeface="Times New Roman"/>
+                <a:sym typeface="Times New Roman"/>
               </a:rPr>
               <a:t>Block </a:t>
             </a:r>
             <a:r>
-              <a:rPr b="0" i="0" lang="en" sz="2400" u="none" cap="none" strike="noStrike">
+              <a:rPr i="0" lang="en" sz="2400" u="none" cap="none" strike="noStrike">
                 <a:solidFill>
                   <a:srgbClr val="000000"/>
                 </a:solidFill>
-                <a:latin typeface="Calibri"/>
-                <a:ea typeface="Calibri"/>
-                <a:cs typeface="Calibri"/>
-                <a:sym typeface="Calibri"/>
+                <a:latin typeface="Times New Roman"/>
+                <a:ea typeface="Times New Roman"/>
+                <a:cs typeface="Times New Roman"/>
+                <a:sym typeface="Times New Roman"/>
               </a:rPr>
               <a:t>elements</a:t>
             </a:r>
-            <a:endParaRPr b="0" i="0" sz="2400" u="none" cap="none" strike="noStrike">
+            <a:endParaRPr i="0" sz="2400" u="none" cap="none" strike="noStrike">
               <a:solidFill>
                 <a:srgbClr val="000000"/>
               </a:solidFill>
-              <a:latin typeface="Calibri"/>
-              <a:ea typeface="Calibri"/>
-              <a:cs typeface="Calibri"/>
-              <a:sym typeface="Calibri"/>
+              <a:latin typeface="Times New Roman"/>
+              <a:ea typeface="Times New Roman"/>
+              <a:cs typeface="Times New Roman"/>
+              <a:sym typeface="Times New Roman"/>
             </a:endParaRPr>
           </a:p>
         </p:txBody>
@@ -19701,7 +19681,7 @@
         <p:spPr>
           <a:xfrm>
             <a:off x="6540595" y="3190714"/>
-            <a:ext cx="2603400" cy="1338600"/>
+            <a:ext cx="2603400" cy="1707900"/>
           </a:xfrm>
           <a:prstGeom prst="rect">
             <a:avLst/>
@@ -19739,33 +19719,33 @@
                 <a:solidFill>
                   <a:srgbClr val="FF0000"/>
                 </a:solidFill>
-                <a:latin typeface="Calibri"/>
-                <a:ea typeface="Calibri"/>
-                <a:cs typeface="Calibri"/>
-                <a:sym typeface="Calibri"/>
+                <a:latin typeface="Times New Roman"/>
+                <a:ea typeface="Times New Roman"/>
+                <a:cs typeface="Times New Roman"/>
+                <a:sym typeface="Times New Roman"/>
               </a:rPr>
               <a:t>Inline </a:t>
             </a:r>
             <a:r>
-              <a:rPr b="0" i="0" lang="en" sz="2400" u="none" cap="none" strike="noStrike">
+              <a:rPr i="0" lang="en" sz="2400" u="none" cap="none" strike="noStrike">
                 <a:solidFill>
                   <a:srgbClr val="000000"/>
                 </a:solidFill>
-                <a:latin typeface="Calibri"/>
-                <a:ea typeface="Calibri"/>
-                <a:cs typeface="Calibri"/>
-                <a:sym typeface="Calibri"/>
+                <a:latin typeface="Times New Roman"/>
+                <a:ea typeface="Times New Roman"/>
+                <a:cs typeface="Times New Roman"/>
+                <a:sym typeface="Times New Roman"/>
               </a:rPr>
               <a:t>element</a:t>
             </a:r>
-            <a:endParaRPr b="0" i="0" sz="2400" u="none" cap="none" strike="noStrike">
+            <a:endParaRPr i="0" sz="2400" u="none" cap="none" strike="noStrike">
               <a:solidFill>
                 <a:srgbClr val="000000"/>
               </a:solidFill>
-              <a:latin typeface="Calibri"/>
-              <a:ea typeface="Calibri"/>
-              <a:cs typeface="Calibri"/>
-              <a:sym typeface="Calibri"/>
+              <a:latin typeface="Times New Roman"/>
+              <a:ea typeface="Times New Roman"/>
+              <a:cs typeface="Times New Roman"/>
+              <a:sym typeface="Times New Roman"/>
             </a:endParaRPr>
           </a:p>
           <a:p>
@@ -19789,14 +19769,14 @@
             <a:r>
               <a:t/>
             </a:r>
-            <a:endParaRPr b="0" i="0" sz="3800" u="none" cap="none" strike="noStrike">
+            <a:endParaRPr i="0" sz="3800" u="none" cap="none" strike="noStrike">
               <a:solidFill>
                 <a:srgbClr val="000000"/>
               </a:solidFill>
-              <a:latin typeface="Calibri"/>
-              <a:ea typeface="Calibri"/>
-              <a:cs typeface="Calibri"/>
-              <a:sym typeface="Calibri"/>
+              <a:latin typeface="Times New Roman"/>
+              <a:ea typeface="Times New Roman"/>
+              <a:cs typeface="Times New Roman"/>
+              <a:sym typeface="Times New Roman"/>
             </a:endParaRPr>
           </a:p>
           <a:p>
@@ -19822,33 +19802,33 @@
                 <a:solidFill>
                   <a:srgbClr val="FF0000"/>
                 </a:solidFill>
-                <a:latin typeface="Calibri"/>
-                <a:ea typeface="Calibri"/>
-                <a:cs typeface="Calibri"/>
-                <a:sym typeface="Calibri"/>
+                <a:latin typeface="Times New Roman"/>
+                <a:ea typeface="Times New Roman"/>
+                <a:cs typeface="Times New Roman"/>
+                <a:sym typeface="Times New Roman"/>
               </a:rPr>
               <a:t>Inline-block </a:t>
             </a:r>
             <a:r>
-              <a:rPr b="0" i="0" lang="en" sz="2400" u="none" cap="none" strike="noStrike">
+              <a:rPr i="0" lang="en" sz="2400" u="none" cap="none" strike="noStrike">
                 <a:solidFill>
                   <a:srgbClr val="000000"/>
                 </a:solidFill>
-                <a:latin typeface="Calibri"/>
-                <a:ea typeface="Calibri"/>
-                <a:cs typeface="Calibri"/>
-                <a:sym typeface="Calibri"/>
+                <a:latin typeface="Times New Roman"/>
+                <a:ea typeface="Times New Roman"/>
+                <a:cs typeface="Times New Roman"/>
+                <a:sym typeface="Times New Roman"/>
               </a:rPr>
               <a:t>element</a:t>
             </a:r>
-            <a:endParaRPr b="0" i="0" sz="2400" u="none" cap="none" strike="noStrike">
+            <a:endParaRPr i="0" sz="2400" u="none" cap="none" strike="noStrike">
               <a:solidFill>
                 <a:srgbClr val="000000"/>
               </a:solidFill>
-              <a:latin typeface="Calibri"/>
-              <a:ea typeface="Calibri"/>
-              <a:cs typeface="Calibri"/>
-              <a:sym typeface="Calibri"/>
+              <a:latin typeface="Times New Roman"/>
+              <a:ea typeface="Times New Roman"/>
+              <a:cs typeface="Times New Roman"/>
+              <a:sym typeface="Times New Roman"/>
             </a:endParaRPr>
           </a:p>
         </p:txBody>
@@ -19919,10 +19899,20 @@
               <a:buNone/>
             </a:pPr>
             <a:r>
-              <a:rPr lang="en" sz="3000"/>
+              <a:rPr lang="en" sz="3600">
+                <a:latin typeface="Times New Roman"/>
+                <a:ea typeface="Times New Roman"/>
+                <a:cs typeface="Times New Roman"/>
+                <a:sym typeface="Times New Roman"/>
+              </a:rPr>
               <a:t>Float</a:t>
             </a:r>
-            <a:endParaRPr sz="3000"/>
+            <a:endParaRPr sz="3600">
+              <a:latin typeface="Times New Roman"/>
+              <a:ea typeface="Times New Roman"/>
+              <a:cs typeface="Times New Roman"/>
+              <a:sym typeface="Times New Roman"/>
+            </a:endParaRPr>
           </a:p>
         </p:txBody>
       </p:sp>
@@ -20325,6 +20315,285 @@
 </file>
 
 <file path=ppt/theme/theme1.xml><?xml version="1.0" encoding="utf-8"?>
+<a:theme xmlns:a="http://schemas.openxmlformats.org/drawingml/2006/main" xmlns:r="http://schemas.openxmlformats.org/officeDocument/2006/relationships">
+  <a:themeElements>
+    <a:clrScheme name="Default">
+      <a:dk1>
+        <a:srgbClr val="000000"/>
+      </a:dk1>
+      <a:lt1>
+        <a:srgbClr val="FFFFFF"/>
+      </a:lt1>
+      <a:dk2>
+        <a:srgbClr val="158158"/>
+      </a:dk2>
+      <a:lt2>
+        <a:srgbClr val="F3F3F3"/>
+      </a:lt2>
+      <a:accent1>
+        <a:srgbClr val="058DC7"/>
+      </a:accent1>
+      <a:accent2>
+        <a:srgbClr val="50B432"/>
+      </a:accent2>
+      <a:accent3>
+        <a:srgbClr val="ED561B"/>
+      </a:accent3>
+      <a:accent4>
+        <a:srgbClr val="EDEF00"/>
+      </a:accent4>
+      <a:accent5>
+        <a:srgbClr val="24CBE5"/>
+      </a:accent5>
+      <a:accent6>
+        <a:srgbClr val="64E572"/>
+      </a:accent6>
+      <a:hlink>
+        <a:srgbClr val="2200CC"/>
+      </a:hlink>
+      <a:folHlink>
+        <a:srgbClr val="551A8B"/>
+      </a:folHlink>
+    </a:clrScheme>
+    <a:fontScheme name="Office">
+      <a:majorFont>
+        <a:latin typeface="Arial"/>
+        <a:ea typeface=""/>
+        <a:cs typeface=""/>
+        <a:font script="Jpan" typeface="ＭＳ Ｐゴシック"/>
+        <a:font script="Hang" typeface="맑은 고딕"/>
+        <a:font script="Hans" typeface="宋体"/>
+        <a:font script="Hant" typeface="新細明體"/>
+        <a:font script="Arab" typeface="Times New Roman"/>
+        <a:font script="Hebr" typeface="Times New Roman"/>
+        <a:font script="Thai" typeface="Angsana New"/>
+        <a:font script="Ethi" typeface="Nyala"/>
+        <a:font script="Beng" typeface="Vrinda"/>
+        <a:font script="Gujr" typeface="Shruti"/>
+        <a:font script="Khmr" typeface="MoolBoran"/>
+        <a:font script="Knda" typeface="Tunga"/>
+        <a:font script="Guru" typeface="Raavi"/>
+        <a:font script="Cans" typeface="Euphemia"/>
+        <a:font script="Cher" typeface="Plantagenet Cherokee"/>
+        <a:font script="Yiii" typeface="Microsoft Yi Baiti"/>
+        <a:font script="Tibt" typeface="Microsoft Himalaya"/>
+        <a:font script="Thaa" typeface="MV Boli"/>
+        <a:font script="Deva" typeface="Mangal"/>
+        <a:font script="Telu" typeface="Gautami"/>
+        <a:font script="Taml" typeface="Latha"/>
+        <a:font script="Syrc" typeface="Estrangelo Edessa"/>
+        <a:font script="Orya" typeface="Kalinga"/>
+        <a:font script="Mlym" typeface="Kartika"/>
+        <a:font script="Laoo" typeface="DokChampa"/>
+        <a:font script="Sinh" typeface="Iskoola Pota"/>
+        <a:font script="Mong" typeface="Mongolian Baiti"/>
+        <a:font script="Viet" typeface="Times New Roman"/>
+        <a:font script="Uigh" typeface="Microsoft Uighur"/>
+        <a:font script="Geor" typeface="Sylfaen"/>
+      </a:majorFont>
+      <a:minorFont>
+        <a:latin typeface="Arial"/>
+        <a:ea typeface=""/>
+        <a:cs typeface=""/>
+        <a:font script="Jpan" typeface="ＭＳ Ｐゴシック"/>
+        <a:font script="Hang" typeface="맑은 고딕"/>
+        <a:font script="Hans" typeface="宋体"/>
+        <a:font script="Hant" typeface="新細明體"/>
+        <a:font script="Arab" typeface="Arial"/>
+        <a:font script="Hebr" typeface="Arial"/>
+        <a:font script="Thai" typeface="Cordia New"/>
+        <a:font script="Ethi" typeface="Nyala"/>
+        <a:font script="Beng" typeface="Vrinda"/>
+        <a:font script="Gujr" typeface="Shruti"/>
+        <a:font script="Khmr" typeface="DaunPenh"/>
+        <a:font script="Knda" typeface="Tunga"/>
+        <a:font script="Guru" typeface="Raavi"/>
+        <a:font script="Cans" typeface="Euphemia"/>
+        <a:font script="Cher" typeface="Plantagenet Cherokee"/>
+        <a:font script="Yiii" typeface="Microsoft Yi Baiti"/>
+        <a:font script="Tibt" typeface="Microsoft Himalaya"/>
+        <a:font script="Thaa" typeface="MV Boli"/>
+        <a:font script="Deva" typeface="Mangal"/>
+        <a:font script="Telu" typeface="Gautami"/>
+        <a:font script="Taml" typeface="Latha"/>
+        <a:font script="Syrc" typeface="Estrangelo Edessa"/>
+        <a:font script="Orya" typeface="Kalinga"/>
+        <a:font script="Mlym" typeface="Kartika"/>
+        <a:font script="Laoo" typeface="DokChampa"/>
+        <a:font script="Sinh" typeface="Iskoola Pota"/>
+        <a:font script="Mong" typeface="Mongolian Baiti"/>
+        <a:font script="Viet" typeface="Arial"/>
+        <a:font script="Uigh" typeface="Microsoft Uighur"/>
+        <a:font script="Geor" typeface="Sylfaen"/>
+      </a:minorFont>
+    </a:fontScheme>
+    <a:fmtScheme name="Office">
+      <a:fillStyleLst>
+        <a:solidFill>
+          <a:schemeClr val="phClr"/>
+        </a:solidFill>
+        <a:gradFill rotWithShape="1">
+          <a:gsLst>
+            <a:gs pos="0">
+              <a:schemeClr val="phClr">
+                <a:tint val="50000"/>
+                <a:satMod val="300000"/>
+              </a:schemeClr>
+            </a:gs>
+            <a:gs pos="35000">
+              <a:schemeClr val="phClr">
+                <a:tint val="37000"/>
+                <a:satMod val="300000"/>
+              </a:schemeClr>
+            </a:gs>
+            <a:gs pos="100000">
+              <a:schemeClr val="phClr">
+                <a:tint val="15000"/>
+                <a:satMod val="350000"/>
+              </a:schemeClr>
+            </a:gs>
+          </a:gsLst>
+          <a:lin ang="16200000" scaled="1"/>
+        </a:gradFill>
+        <a:gradFill rotWithShape="1">
+          <a:gsLst>
+            <a:gs pos="0">
+              <a:schemeClr val="phClr">
+                <a:tint val="100000"/>
+                <a:shade val="100000"/>
+                <a:satMod val="130000"/>
+              </a:schemeClr>
+            </a:gs>
+            <a:gs pos="100000">
+              <a:schemeClr val="phClr">
+                <a:tint val="50000"/>
+                <a:shade val="100000"/>
+                <a:satMod val="350000"/>
+              </a:schemeClr>
+            </a:gs>
+          </a:gsLst>
+          <a:lin ang="16200000" scaled="0"/>
+        </a:gradFill>
+      </a:fillStyleLst>
+      <a:lnStyleLst>
+        <a:ln w="9525" cap="flat" cmpd="sng" algn="ctr">
+          <a:solidFill>
+            <a:schemeClr val="phClr">
+              <a:shade val="95000"/>
+              <a:satMod val="105000"/>
+            </a:schemeClr>
+          </a:solidFill>
+          <a:prstDash val="solid"/>
+        </a:ln>
+        <a:ln w="25400" cap="flat" cmpd="sng" algn="ctr">
+          <a:solidFill>
+            <a:schemeClr val="phClr"/>
+          </a:solidFill>
+          <a:prstDash val="solid"/>
+        </a:ln>
+        <a:ln w="38100" cap="flat" cmpd="sng" algn="ctr">
+          <a:solidFill>
+            <a:schemeClr val="phClr"/>
+          </a:solidFill>
+          <a:prstDash val="solid"/>
+        </a:ln>
+      </a:lnStyleLst>
+      <a:effectStyleLst>
+        <a:effectStyle>
+          <a:effectLst>
+            <a:outerShdw blurRad="40000" dist="20000" dir="5400000" rotWithShape="0">
+              <a:srgbClr val="000000">
+                <a:alpha val="38000"/>
+              </a:srgbClr>
+            </a:outerShdw>
+          </a:effectLst>
+        </a:effectStyle>
+        <a:effectStyle>
+          <a:effectLst>
+            <a:outerShdw blurRad="40000" dist="23000" dir="5400000" rotWithShape="0">
+              <a:srgbClr val="000000">
+                <a:alpha val="35000"/>
+              </a:srgbClr>
+            </a:outerShdw>
+          </a:effectLst>
+        </a:effectStyle>
+        <a:effectStyle>
+          <a:effectLst>
+            <a:outerShdw blurRad="40000" dist="23000" dir="5400000" rotWithShape="0">
+              <a:srgbClr val="000000">
+                <a:alpha val="35000"/>
+              </a:srgbClr>
+            </a:outerShdw>
+          </a:effectLst>
+          <a:scene3d>
+            <a:camera prst="orthographicFront">
+              <a:rot lat="0" lon="0" rev="0"/>
+            </a:camera>
+            <a:lightRig rig="threePt" dir="t">
+              <a:rot lat="0" lon="0" rev="1200000"/>
+            </a:lightRig>
+          </a:scene3d>
+          <a:sp3d>
+            <a:bevelT w="63500" h="25400"/>
+          </a:sp3d>
+        </a:effectStyle>
+      </a:effectStyleLst>
+      <a:bgFillStyleLst>
+        <a:solidFill>
+          <a:schemeClr val="phClr"/>
+        </a:solidFill>
+        <a:gradFill rotWithShape="1">
+          <a:gsLst>
+            <a:gs pos="0">
+              <a:schemeClr val="phClr">
+                <a:tint val="40000"/>
+                <a:satMod val="350000"/>
+              </a:schemeClr>
+            </a:gs>
+            <a:gs pos="40000">
+              <a:schemeClr val="phClr">
+                <a:tint val="45000"/>
+                <a:shade val="99000"/>
+                <a:satMod val="350000"/>
+              </a:schemeClr>
+            </a:gs>
+            <a:gs pos="100000">
+              <a:schemeClr val="phClr">
+                <a:shade val="20000"/>
+                <a:satMod val="255000"/>
+              </a:schemeClr>
+            </a:gs>
+          </a:gsLst>
+          <a:path path="circle">
+            <a:fillToRect l="50000" t="-80000" r="50000" b="180000"/>
+          </a:path>
+        </a:gradFill>
+        <a:gradFill rotWithShape="1">
+          <a:gsLst>
+            <a:gs pos="0">
+              <a:schemeClr val="phClr">
+                <a:tint val="80000"/>
+                <a:satMod val="300000"/>
+              </a:schemeClr>
+            </a:gs>
+            <a:gs pos="100000">
+              <a:schemeClr val="phClr">
+                <a:shade val="30000"/>
+                <a:satMod val="200000"/>
+              </a:schemeClr>
+            </a:gs>
+          </a:gsLst>
+          <a:path path="circle">
+            <a:fillToRect l="50000" t="50000" r="50000" b="50000"/>
+          </a:path>
+        </a:gradFill>
+      </a:bgFillStyleLst>
+    </a:fmtScheme>
+  </a:themeElements>
+</a:theme>
+</file>
+
+<file path=ppt/theme/theme2.xml><?xml version="1.0" encoding="utf-8"?>
 <a:theme xmlns:a="http://schemas.openxmlformats.org/drawingml/2006/main" xmlns:r="http://schemas.openxmlformats.org/officeDocument/2006/relationships" name="Simple Light">
   <a:themeElements>
     <a:clrScheme name="Simple Light">
@@ -20601,283 +20870,4 @@
     </a:fmtScheme>
   </a:themeElements>
 </a:theme>
-</file>
-
-<file path=ppt/theme/theme2.xml><?xml version="1.0" encoding="utf-8"?>
-<a:theme xmlns:a="http://schemas.openxmlformats.org/drawingml/2006/main" xmlns:r="http://schemas.openxmlformats.org/officeDocument/2006/relationships">
-  <a:themeElements>
-    <a:clrScheme name="Default">
-      <a:dk1>
-        <a:srgbClr val="000000"/>
-      </a:dk1>
-      <a:lt1>
-        <a:srgbClr val="FFFFFF"/>
-      </a:lt1>
-      <a:dk2>
-        <a:srgbClr val="158158"/>
-      </a:dk2>
-      <a:lt2>
-        <a:srgbClr val="F3F3F3"/>
-      </a:lt2>
-      <a:accent1>
-        <a:srgbClr val="058DC7"/>
-      </a:accent1>
-      <a:accent2>
-        <a:srgbClr val="50B432"/>
-      </a:accent2>
-      <a:accent3>
-        <a:srgbClr val="ED561B"/>
-      </a:accent3>
-      <a:accent4>
-        <a:srgbClr val="EDEF00"/>
-      </a:accent4>
-      <a:accent5>
-        <a:srgbClr val="24CBE5"/>
-      </a:accent5>
-      <a:accent6>
-        <a:srgbClr val="64E572"/>
-      </a:accent6>
-      <a:hlink>
-        <a:srgbClr val="2200CC"/>
-      </a:hlink>
-      <a:folHlink>
-        <a:srgbClr val="551A8B"/>
-      </a:folHlink>
-    </a:clrScheme>
-    <a:fontScheme name="Office">
-      <a:majorFont>
-        <a:latin typeface="Arial"/>
-        <a:ea typeface=""/>
-        <a:cs typeface=""/>
-        <a:font script="Jpan" typeface="ＭＳ Ｐゴシック"/>
-        <a:font script="Hang" typeface="맑은 고딕"/>
-        <a:font script="Hans" typeface="宋体"/>
-        <a:font script="Hant" typeface="新細明體"/>
-        <a:font script="Arab" typeface="Times New Roman"/>
-        <a:font script="Hebr" typeface="Times New Roman"/>
-        <a:font script="Thai" typeface="Angsana New"/>
-        <a:font script="Ethi" typeface="Nyala"/>
-        <a:font script="Beng" typeface="Vrinda"/>
-        <a:font script="Gujr" typeface="Shruti"/>
-        <a:font script="Khmr" typeface="MoolBoran"/>
-        <a:font script="Knda" typeface="Tunga"/>
-        <a:font script="Guru" typeface="Raavi"/>
-        <a:font script="Cans" typeface="Euphemia"/>
-        <a:font script="Cher" typeface="Plantagenet Cherokee"/>
-        <a:font script="Yiii" typeface="Microsoft Yi Baiti"/>
-        <a:font script="Tibt" typeface="Microsoft Himalaya"/>
-        <a:font script="Thaa" typeface="MV Boli"/>
-        <a:font script="Deva" typeface="Mangal"/>
-        <a:font script="Telu" typeface="Gautami"/>
-        <a:font script="Taml" typeface="Latha"/>
-        <a:font script="Syrc" typeface="Estrangelo Edessa"/>
-        <a:font script="Orya" typeface="Kalinga"/>
-        <a:font script="Mlym" typeface="Kartika"/>
-        <a:font script="Laoo" typeface="DokChampa"/>
-        <a:font script="Sinh" typeface="Iskoola Pota"/>
-        <a:font script="Mong" typeface="Mongolian Baiti"/>
-        <a:font script="Viet" typeface="Times New Roman"/>
-        <a:font script="Uigh" typeface="Microsoft Uighur"/>
-        <a:font script="Geor" typeface="Sylfaen"/>
-      </a:majorFont>
-      <a:minorFont>
-        <a:latin typeface="Arial"/>
-        <a:ea typeface=""/>
-        <a:cs typeface=""/>
-        <a:font script="Jpan" typeface="ＭＳ Ｐゴシック"/>
-        <a:font script="Hang" typeface="맑은 고딕"/>
-        <a:font script="Hans" typeface="宋体"/>
-        <a:font script="Hant" typeface="新細明體"/>
-        <a:font script="Arab" typeface="Arial"/>
-        <a:font script="Hebr" typeface="Arial"/>
-        <a:font script="Thai" typeface="Cordia New"/>
-        <a:font script="Ethi" typeface="Nyala"/>
-        <a:font script="Beng" typeface="Vrinda"/>
-        <a:font script="Gujr" typeface="Shruti"/>
-        <a:font script="Khmr" typeface="DaunPenh"/>
-        <a:font script="Knda" typeface="Tunga"/>
-        <a:font script="Guru" typeface="Raavi"/>
-        <a:font script="Cans" typeface="Euphemia"/>
-        <a:font script="Cher" typeface="Plantagenet Cherokee"/>
-        <a:font script="Yiii" typeface="Microsoft Yi Baiti"/>
-        <a:font script="Tibt" typeface="Microsoft Himalaya"/>
-        <a:font script="Thaa" typeface="MV Boli"/>
-        <a:font script="Deva" typeface="Mangal"/>
-        <a:font script="Telu" typeface="Gautami"/>
-        <a:font script="Taml" typeface="Latha"/>
-        <a:font script="Syrc" typeface="Estrangelo Edessa"/>
-        <a:font script="Orya" typeface="Kalinga"/>
-        <a:font script="Mlym" typeface="Kartika"/>
-        <a:font script="Laoo" typeface="DokChampa"/>
-        <a:font script="Sinh" typeface="Iskoola Pota"/>
-        <a:font script="Mong" typeface="Mongolian Baiti"/>
-        <a:font script="Viet" typeface="Arial"/>
-        <a:font script="Uigh" typeface="Microsoft Uighur"/>
-        <a:font script="Geor" typeface="Sylfaen"/>
-      </a:minorFont>
-    </a:fontScheme>
-    <a:fmtScheme name="Office">
-      <a:fillStyleLst>
-        <a:solidFill>
-          <a:schemeClr val="phClr"/>
-        </a:solidFill>
-        <a:gradFill rotWithShape="1">
-          <a:gsLst>
-            <a:gs pos="0">
-              <a:schemeClr val="phClr">
-                <a:tint val="50000"/>
-                <a:satMod val="300000"/>
-              </a:schemeClr>
-            </a:gs>
-            <a:gs pos="35000">
-              <a:schemeClr val="phClr">
-                <a:tint val="37000"/>
-                <a:satMod val="300000"/>
-              </a:schemeClr>
-            </a:gs>
-            <a:gs pos="100000">
-              <a:schemeClr val="phClr">
-                <a:tint val="15000"/>
-                <a:satMod val="350000"/>
-              </a:schemeClr>
-            </a:gs>
-          </a:gsLst>
-          <a:lin ang="16200000" scaled="1"/>
-        </a:gradFill>
-        <a:gradFill rotWithShape="1">
-          <a:gsLst>
-            <a:gs pos="0">
-              <a:schemeClr val="phClr">
-                <a:tint val="100000"/>
-                <a:shade val="100000"/>
-                <a:satMod val="130000"/>
-              </a:schemeClr>
-            </a:gs>
-            <a:gs pos="100000">
-              <a:schemeClr val="phClr">
-                <a:tint val="50000"/>
-                <a:shade val="100000"/>
-                <a:satMod val="350000"/>
-              </a:schemeClr>
-            </a:gs>
-          </a:gsLst>
-          <a:lin ang="16200000" scaled="0"/>
-        </a:gradFill>
-      </a:fillStyleLst>
-      <a:lnStyleLst>
-        <a:ln w="9525" cap="flat" cmpd="sng" algn="ctr">
-          <a:solidFill>
-            <a:schemeClr val="phClr">
-              <a:shade val="95000"/>
-              <a:satMod val="105000"/>
-            </a:schemeClr>
-          </a:solidFill>
-          <a:prstDash val="solid"/>
-        </a:ln>
-        <a:ln w="25400" cap="flat" cmpd="sng" algn="ctr">
-          <a:solidFill>
-            <a:schemeClr val="phClr"/>
-          </a:solidFill>
-          <a:prstDash val="solid"/>
-        </a:ln>
-        <a:ln w="38100" cap="flat" cmpd="sng" algn="ctr">
-          <a:solidFill>
-            <a:schemeClr val="phClr"/>
-          </a:solidFill>
-          <a:prstDash val="solid"/>
-        </a:ln>
-      </a:lnStyleLst>
-      <a:effectStyleLst>
-        <a:effectStyle>
-          <a:effectLst>
-            <a:outerShdw blurRad="40000" dist="20000" dir="5400000" rotWithShape="0">
-              <a:srgbClr val="000000">
-                <a:alpha val="38000"/>
-              </a:srgbClr>
-            </a:outerShdw>
-          </a:effectLst>
-        </a:effectStyle>
-        <a:effectStyle>
-          <a:effectLst>
-            <a:outerShdw blurRad="40000" dist="23000" dir="5400000" rotWithShape="0">
-              <a:srgbClr val="000000">
-                <a:alpha val="35000"/>
-              </a:srgbClr>
-            </a:outerShdw>
-          </a:effectLst>
-        </a:effectStyle>
-        <a:effectStyle>
-          <a:effectLst>
-            <a:outerShdw blurRad="40000" dist="23000" dir="5400000" rotWithShape="0">
-              <a:srgbClr val="000000">
-                <a:alpha val="35000"/>
-              </a:srgbClr>
-            </a:outerShdw>
-          </a:effectLst>
-          <a:scene3d>
-            <a:camera prst="orthographicFront">
-              <a:rot lat="0" lon="0" rev="0"/>
-            </a:camera>
-            <a:lightRig rig="threePt" dir="t">
-              <a:rot lat="0" lon="0" rev="1200000"/>
-            </a:lightRig>
-          </a:scene3d>
-          <a:sp3d>
-            <a:bevelT w="63500" h="25400"/>
-          </a:sp3d>
-        </a:effectStyle>
-      </a:effectStyleLst>
-      <a:bgFillStyleLst>
-        <a:solidFill>
-          <a:schemeClr val="phClr"/>
-        </a:solidFill>
-        <a:gradFill rotWithShape="1">
-          <a:gsLst>
-            <a:gs pos="0">
-              <a:schemeClr val="phClr">
-                <a:tint val="40000"/>
-                <a:satMod val="350000"/>
-              </a:schemeClr>
-            </a:gs>
-            <a:gs pos="40000">
-              <a:schemeClr val="phClr">
-                <a:tint val="45000"/>
-                <a:shade val="99000"/>
-                <a:satMod val="350000"/>
-              </a:schemeClr>
-            </a:gs>
-            <a:gs pos="100000">
-              <a:schemeClr val="phClr">
-                <a:shade val="20000"/>
-                <a:satMod val="255000"/>
-              </a:schemeClr>
-            </a:gs>
-          </a:gsLst>
-          <a:path path="circle">
-            <a:fillToRect l="50000" t="-80000" r="50000" b="180000"/>
-          </a:path>
-        </a:gradFill>
-        <a:gradFill rotWithShape="1">
-          <a:gsLst>
-            <a:gs pos="0">
-              <a:schemeClr val="phClr">
-                <a:tint val="80000"/>
-                <a:satMod val="300000"/>
-              </a:schemeClr>
-            </a:gs>
-            <a:gs pos="100000">
-              <a:schemeClr val="phClr">
-                <a:shade val="30000"/>
-                <a:satMod val="200000"/>
-              </a:schemeClr>
-            </a:gs>
-          </a:gsLst>
-          <a:path path="circle">
-            <a:fillToRect l="50000" t="50000" r="50000" b="50000"/>
-          </a:path>
-        </a:gradFill>
-      </a:bgFillStyleLst>
-    </a:fmtScheme>
-  </a:themeElements>
-</a:theme>
 </file>
</xml_diff>